<commit_message>
Added FSM for application lifecycle (#393)
* FSM Builder
* TrdFsmModel proxy object is added
* config loader process
* process life cycle
* move to global fsm change conditional transition approach
* move from event callbacks to state callbacks
* fysom global objects are not usable with multiple fsm objects
* transitions model builder
* shut down event
* uncomment validate address
* CMD_ARGS_GIVEN state added for unittests providing test arguments
* import correct parameterized
* disabled test test_dry_run in test_tzkt_api.py
* document update
* transitions builder tests added
* remove unused fysom classes
* life cycle shut downs upon error
* flake8 changes
* unit test added: test_lauch_states.py
* removed argumets list, used args object.
* Contributor: habanoz, Effort=27h
* Reviewer: vkresch, Effort=4h
</commit_message>
<xml_diff>
--- a/docs/fsm/application_launch_state_diagram_1.0.pptx
+++ b/docs/fsm/application_launch_state_diagram_1.0.pptx
@@ -104,6 +104,11 @@
       </a:defRPr>
     </a:lvl9pPr>
   </p:defaultTextStyle>
+  <p:extLst>
+    <p:ext uri="{EFAFB233-063F-42B5-8137-9DF3F51BA10A}">
+      <p15:sldGuideLst xmlns:p15="http://schemas.microsoft.com/office/powerpoint/2012/main"/>
+    </p:ext>
+  </p:extLst>
 </p:presentation>
 </file>
 
@@ -238,7 +243,7 @@
           <a:p>
             <a:fld id="{2B0DBD80-751A-46DF-89F9-9AECBC68258F}" type="datetimeFigureOut">
               <a:rPr lang="tr-TR" smtClean="0"/>
-              <a:t>19.03.2021</a:t>
+              <a:t>29.03.2021</a:t>
             </a:fld>
             <a:endParaRPr lang="tr-TR"/>
           </a:p>
@@ -408,7 +413,7 @@
           <a:p>
             <a:fld id="{2B0DBD80-751A-46DF-89F9-9AECBC68258F}" type="datetimeFigureOut">
               <a:rPr lang="tr-TR" smtClean="0"/>
-              <a:t>19.03.2021</a:t>
+              <a:t>29.03.2021</a:t>
             </a:fld>
             <a:endParaRPr lang="tr-TR"/>
           </a:p>
@@ -588,7 +593,7 @@
           <a:p>
             <a:fld id="{2B0DBD80-751A-46DF-89F9-9AECBC68258F}" type="datetimeFigureOut">
               <a:rPr lang="tr-TR" smtClean="0"/>
-              <a:t>19.03.2021</a:t>
+              <a:t>29.03.2021</a:t>
             </a:fld>
             <a:endParaRPr lang="tr-TR"/>
           </a:p>
@@ -758,7 +763,7 @@
           <a:p>
             <a:fld id="{2B0DBD80-751A-46DF-89F9-9AECBC68258F}" type="datetimeFigureOut">
               <a:rPr lang="tr-TR" smtClean="0"/>
-              <a:t>19.03.2021</a:t>
+              <a:t>29.03.2021</a:t>
             </a:fld>
             <a:endParaRPr lang="tr-TR"/>
           </a:p>
@@ -1004,7 +1009,7 @@
           <a:p>
             <a:fld id="{2B0DBD80-751A-46DF-89F9-9AECBC68258F}" type="datetimeFigureOut">
               <a:rPr lang="tr-TR" smtClean="0"/>
-              <a:t>19.03.2021</a:t>
+              <a:t>29.03.2021</a:t>
             </a:fld>
             <a:endParaRPr lang="tr-TR"/>
           </a:p>
@@ -1236,7 +1241,7 @@
           <a:p>
             <a:fld id="{2B0DBD80-751A-46DF-89F9-9AECBC68258F}" type="datetimeFigureOut">
               <a:rPr lang="tr-TR" smtClean="0"/>
-              <a:t>19.03.2021</a:t>
+              <a:t>29.03.2021</a:t>
             </a:fld>
             <a:endParaRPr lang="tr-TR"/>
           </a:p>
@@ -1603,7 +1608,7 @@
           <a:p>
             <a:fld id="{2B0DBD80-751A-46DF-89F9-9AECBC68258F}" type="datetimeFigureOut">
               <a:rPr lang="tr-TR" smtClean="0"/>
-              <a:t>19.03.2021</a:t>
+              <a:t>29.03.2021</a:t>
             </a:fld>
             <a:endParaRPr lang="tr-TR"/>
           </a:p>
@@ -1721,7 +1726,7 @@
           <a:p>
             <a:fld id="{2B0DBD80-751A-46DF-89F9-9AECBC68258F}" type="datetimeFigureOut">
               <a:rPr lang="tr-TR" smtClean="0"/>
-              <a:t>19.03.2021</a:t>
+              <a:t>29.03.2021</a:t>
             </a:fld>
             <a:endParaRPr lang="tr-TR"/>
           </a:p>
@@ -1816,7 +1821,7 @@
           <a:p>
             <a:fld id="{2B0DBD80-751A-46DF-89F9-9AECBC68258F}" type="datetimeFigureOut">
               <a:rPr lang="tr-TR" smtClean="0"/>
-              <a:t>19.03.2021</a:t>
+              <a:t>29.03.2021</a:t>
             </a:fld>
             <a:endParaRPr lang="tr-TR"/>
           </a:p>
@@ -2093,7 +2098,7 @@
           <a:p>
             <a:fld id="{2B0DBD80-751A-46DF-89F9-9AECBC68258F}" type="datetimeFigureOut">
               <a:rPr lang="tr-TR" smtClean="0"/>
-              <a:t>19.03.2021</a:t>
+              <a:t>29.03.2021</a:t>
             </a:fld>
             <a:endParaRPr lang="tr-TR"/>
           </a:p>
@@ -2346,7 +2351,7 @@
           <a:p>
             <a:fld id="{2B0DBD80-751A-46DF-89F9-9AECBC68258F}" type="datetimeFigureOut">
               <a:rPr lang="tr-TR" smtClean="0"/>
-              <a:t>19.03.2021</a:t>
+              <a:t>29.03.2021</a:t>
             </a:fld>
             <a:endParaRPr lang="tr-TR"/>
           </a:p>
@@ -2559,7 +2564,7 @@
           <a:p>
             <a:fld id="{2B0DBD80-751A-46DF-89F9-9AECBC68258F}" type="datetimeFigureOut">
               <a:rPr lang="tr-TR" smtClean="0"/>
-              <a:t>19.03.2021</a:t>
+              <a:t>29.03.2021</a:t>
             </a:fld>
             <a:endParaRPr lang="tr-TR"/>
           </a:p>
@@ -3010,7 +3015,7 @@
         </p:nvSpPr>
         <p:spPr>
           <a:xfrm>
-            <a:off x="3542146" y="394853"/>
+            <a:off x="4341197" y="1394691"/>
             <a:ext cx="997527" cy="997527"/>
           </a:xfrm>
           <a:prstGeom prst="roundRect">
@@ -3052,7 +3057,7 @@
         </p:nvSpPr>
         <p:spPr>
           <a:xfrm>
-            <a:off x="569769" y="699654"/>
+            <a:off x="117944" y="1006777"/>
             <a:ext cx="378691" cy="378691"/>
           </a:xfrm>
           <a:prstGeom prst="ellipse">
@@ -3170,7 +3175,7 @@
         </p:nvSpPr>
         <p:spPr>
           <a:xfrm>
-            <a:off x="1865746" y="394853"/>
+            <a:off x="1798838" y="1394691"/>
             <a:ext cx="997527" cy="997527"/>
           </a:xfrm>
           <a:prstGeom prst="roundRect">
@@ -3198,8 +3203,26 @@
             <a:pPr algn="ctr"/>
             <a:r>
               <a:rPr lang="tr-TR" sz="1200" dirty="0" smtClean="0"/>
-              <a:t>Parse Command Line Arguments</a:t>
-            </a:r>
+              <a:t>Parse</a:t>
+            </a:r>
+          </a:p>
+          <a:p>
+            <a:pPr algn="ctr"/>
+            <a:r>
+              <a:rPr lang="tr-TR" sz="1200" dirty="0" smtClean="0"/>
+              <a:t>Command </a:t>
+            </a:r>
+            <a:r>
+              <a:rPr lang="tr-TR" sz="1200" dirty="0" smtClean="0"/>
+              <a:t>Line </a:t>
+            </a:r>
+            <a:r>
+              <a:rPr lang="tr-TR" sz="1200" dirty="0" smtClean="0"/>
+              <a:t>Arguments</a:t>
+            </a:r>
+          </a:p>
+          <a:p>
+            <a:pPr algn="ctr"/>
             <a:endParaRPr lang="tr-TR" sz="1200" dirty="0"/>
           </a:p>
         </p:txBody>
@@ -3207,13 +3230,15 @@
       <p:sp>
         <p:nvSpPr>
           <p:cNvPr id="12" name="Rounded Rectangle 11"/>
-          <p:cNvSpPr/>
-          <p:nvPr/>
-        </p:nvSpPr>
-        <p:spPr>
-          <a:xfrm>
-            <a:off x="6741966" y="1153394"/>
-            <a:ext cx="997527" cy="997527"/>
+          <p:cNvSpPr>
+            <a:spLocks noChangeAspect="1"/>
+          </p:cNvSpPr>
+          <p:nvPr/>
+        </p:nvSpPr>
+        <p:spPr>
+          <a:xfrm>
+            <a:off x="6797381" y="820886"/>
+            <a:ext cx="798022" cy="798022"/>
           </a:xfrm>
           <a:prstGeom prst="roundRect">
             <a:avLst/>
@@ -3240,7 +3265,7 @@
             <a:pPr algn="ctr"/>
             <a:r>
               <a:rPr lang="tr-TR" sz="1000" dirty="0" smtClean="0"/>
-              <a:t>Read Configuration File</a:t>
+              <a:t>Read Config File</a:t>
             </a:r>
             <a:endParaRPr lang="tr-TR" sz="1000" dirty="0"/>
           </a:p>
@@ -3249,13 +3274,15 @@
       <p:sp>
         <p:nvSpPr>
           <p:cNvPr id="13" name="Rounded Rectangle 12"/>
-          <p:cNvSpPr/>
-          <p:nvPr/>
-        </p:nvSpPr>
-        <p:spPr>
-          <a:xfrm>
-            <a:off x="8021202" y="1153396"/>
-            <a:ext cx="997527" cy="997527"/>
+          <p:cNvSpPr>
+            <a:spLocks noChangeAspect="1"/>
+          </p:cNvSpPr>
+          <p:nvPr/>
+        </p:nvSpPr>
+        <p:spPr>
+          <a:xfrm>
+            <a:off x="8076617" y="820888"/>
+            <a:ext cx="798022" cy="798022"/>
           </a:xfrm>
           <a:prstGeom prst="roundRect">
             <a:avLst/>
@@ -3282,7 +3309,7 @@
             <a:pPr algn="ctr"/>
             <a:r>
               <a:rPr lang="tr-TR" sz="1000" dirty="0" smtClean="0"/>
-              <a:t>Validate Configuration File</a:t>
+              <a:t>Parse Config File</a:t>
             </a:r>
             <a:endParaRPr lang="tr-TR" sz="1000" dirty="0"/>
           </a:p>
@@ -3291,13 +3318,15 @@
       <p:sp>
         <p:nvSpPr>
           <p:cNvPr id="14" name="Rounded Rectangle 13"/>
-          <p:cNvSpPr/>
-          <p:nvPr/>
-        </p:nvSpPr>
-        <p:spPr>
-          <a:xfrm>
-            <a:off x="9245019" y="1151081"/>
-            <a:ext cx="997527" cy="997527"/>
+          <p:cNvSpPr>
+            <a:spLocks noChangeAspect="1"/>
+          </p:cNvSpPr>
+          <p:nvPr/>
+        </p:nvSpPr>
+        <p:spPr>
+          <a:xfrm>
+            <a:off x="9300434" y="818573"/>
+            <a:ext cx="798022" cy="798022"/>
           </a:xfrm>
           <a:prstGeom prst="roundRect">
             <a:avLst/>
@@ -3324,7 +3353,7 @@
             <a:pPr algn="ctr"/>
             <a:r>
               <a:rPr lang="tr-TR" sz="1000" dirty="0" smtClean="0"/>
-              <a:t>Post Proces Configuration File</a:t>
+              <a:t>Post Proces Config File</a:t>
             </a:r>
             <a:endParaRPr lang="tr-TR" sz="1000" dirty="0"/>
           </a:p>
@@ -3365,14 +3394,14 @@
           <p:cNvPr id="20" name="Straight Arrow Connector 19"/>
           <p:cNvCxnSpPr>
             <a:stCxn id="8" idx="6"/>
-            <a:endCxn id="11" idx="1"/>
+            <a:endCxn id="79" idx="1"/>
           </p:cNvCxnSpPr>
           <p:nvPr/>
         </p:nvCxnSpPr>
         <p:spPr>
           <a:xfrm>
-            <a:off x="948460" y="889000"/>
-            <a:ext cx="917286" cy="4617"/>
+            <a:off x="496635" y="1196123"/>
+            <a:ext cx="369940" cy="1"/>
           </a:xfrm>
           <a:prstGeom prst="straightConnector1">
             <a:avLst/>
@@ -3516,7 +3545,7 @@
             <a:pPr algn="ctr"/>
             <a:r>
               <a:rPr lang="tr-TR" sz="1000" dirty="0" smtClean="0"/>
-              <a:t>Initialize Fees</a:t>
+              <a:t>Initialize Service Fees</a:t>
             </a:r>
             <a:endParaRPr lang="tr-TR" sz="1000" dirty="0"/>
           </a:p>
@@ -3610,15 +3639,15 @@
         <p:nvCxnSpPr>
           <p:cNvPr id="30" name="Straight Arrow Connector 29"/>
           <p:cNvCxnSpPr>
-            <a:stCxn id="11" idx="3"/>
-            <a:endCxn id="7" idx="1"/>
+            <a:stCxn id="11" idx="0"/>
+            <a:endCxn id="91" idx="2"/>
           </p:cNvCxnSpPr>
           <p:nvPr/>
         </p:nvCxnSpPr>
         <p:spPr>
-          <a:xfrm>
-            <a:off x="2863273" y="893617"/>
-            <a:ext cx="678873" cy="0"/>
+          <a:xfrm flipH="1" flipV="1">
+            <a:off x="2296950" y="1116215"/>
+            <a:ext cx="652" cy="278476"/>
           </a:xfrm>
           <a:prstGeom prst="straightConnector1">
             <a:avLst/>
@@ -3652,12 +3681,14 @@
           <p:nvPr/>
         </p:nvCxnSpPr>
         <p:spPr>
-          <a:xfrm>
-            <a:off x="4539673" y="893617"/>
-            <a:ext cx="1363516" cy="756228"/>
-          </a:xfrm>
-          <a:prstGeom prst="straightConnector1">
-            <a:avLst/>
+          <a:xfrm flipV="1">
+            <a:off x="5338724" y="1649845"/>
+            <a:ext cx="564465" cy="243610"/>
+          </a:xfrm>
+          <a:prstGeom prst="bentConnector3">
+            <a:avLst>
+              <a:gd name="adj1" fmla="val 50000"/>
+            </a:avLst>
           </a:prstGeom>
           <a:ln>
             <a:tailEnd type="triangle"/>
@@ -3806,9 +3837,9 @@
           <p:nvPr/>
         </p:nvCxnSpPr>
         <p:spPr>
-          <a:xfrm>
-            <a:off x="6328639" y="1649845"/>
-            <a:ext cx="413327" cy="2313"/>
+          <a:xfrm flipV="1">
+            <a:off x="6328639" y="1219897"/>
+            <a:ext cx="468742" cy="429948"/>
           </a:xfrm>
           <a:prstGeom prst="straightConnector1">
             <a:avLst/>
@@ -3843,8 +3874,8 @@
         </p:nvCxnSpPr>
         <p:spPr>
           <a:xfrm>
-            <a:off x="10242546" y="1649845"/>
-            <a:ext cx="351561" cy="7215"/>
+            <a:off x="10098456" y="1217584"/>
+            <a:ext cx="495651" cy="439476"/>
           </a:xfrm>
           <a:prstGeom prst="straightConnector1">
             <a:avLst/>
@@ -3872,17 +3903,17 @@
         <p:nvCxnSpPr>
           <p:cNvPr id="46" name="Straight Arrow Connector 45"/>
           <p:cNvCxnSpPr>
-            <a:stCxn id="12" idx="3"/>
-            <a:endCxn id="13" idx="1"/>
+            <a:stCxn id="12" idx="2"/>
+            <a:endCxn id="120" idx="1"/>
           </p:cNvCxnSpPr>
           <p:nvPr/>
         </p:nvCxnSpPr>
         <p:spPr>
-          <a:xfrm>
-            <a:off x="7739493" y="1652158"/>
-            <a:ext cx="281709" cy="2"/>
-          </a:xfrm>
-          <a:prstGeom prst="straightConnector1">
+          <a:xfrm rot="16200000" flipH="1">
+            <a:off x="7087399" y="1727900"/>
+            <a:ext cx="470510" cy="252525"/>
+          </a:xfrm>
+          <a:prstGeom prst="bentConnector2">
             <a:avLst/>
           </a:prstGeom>
           <a:ln>
@@ -3908,17 +3939,17 @@
         <p:nvCxnSpPr>
           <p:cNvPr id="49" name="Straight Arrow Connector 48"/>
           <p:cNvCxnSpPr>
-            <a:stCxn id="13" idx="3"/>
-            <a:endCxn id="14" idx="1"/>
+            <a:stCxn id="120" idx="0"/>
+            <a:endCxn id="13" idx="1"/>
           </p:cNvCxnSpPr>
           <p:nvPr/>
         </p:nvCxnSpPr>
         <p:spPr>
-          <a:xfrm flipV="1">
-            <a:off x="9018729" y="1649845"/>
-            <a:ext cx="226290" cy="2315"/>
-          </a:xfrm>
-          <a:prstGeom prst="straightConnector1">
+          <a:xfrm rot="5400000" flipH="1" flipV="1">
+            <a:off x="7727018" y="1340809"/>
+            <a:ext cx="470508" cy="228689"/>
+          </a:xfrm>
+          <a:prstGeom prst="bentConnector2">
             <a:avLst/>
           </a:prstGeom>
           <a:ln>
@@ -3951,8 +3982,8 @@
         </p:nvCxnSpPr>
         <p:spPr>
           <a:xfrm rot="5400000">
-            <a:off x="886407" y="1454433"/>
-            <a:ext cx="1540156" cy="1416050"/>
+            <a:off x="1352872" y="1987806"/>
+            <a:ext cx="540318" cy="1349142"/>
           </a:xfrm>
           <a:prstGeom prst="bentConnector2">
             <a:avLst/>
@@ -4017,8 +4048,8 @@
         </p:nvCxnSpPr>
         <p:spPr>
           <a:xfrm rot="5400000">
-            <a:off x="1724607" y="616233"/>
-            <a:ext cx="1540156" cy="3092450"/>
+            <a:off x="2624052" y="716627"/>
+            <a:ext cx="540318" cy="3891501"/>
           </a:xfrm>
           <a:prstGeom prst="bentConnector2">
             <a:avLst/>
@@ -4118,56 +4149,22 @@
       </p:cxnSp>
       <p:cxnSp>
         <p:nvCxnSpPr>
-          <p:cNvPr id="61" name="Straight Arrow Connector 60"/>
-          <p:cNvCxnSpPr>
-            <a:stCxn id="24" idx="1"/>
-            <a:endCxn id="26" idx="3"/>
-          </p:cNvCxnSpPr>
-          <p:nvPr/>
-        </p:nvCxnSpPr>
-        <p:spPr>
-          <a:xfrm flipH="1" flipV="1">
-            <a:off x="9355281" y="4627393"/>
-            <a:ext cx="564281" cy="1"/>
-          </a:xfrm>
-          <a:prstGeom prst="straightConnector1">
-            <a:avLst/>
-          </a:prstGeom>
-          <a:ln>
-            <a:tailEnd type="triangle"/>
-          </a:ln>
-        </p:spPr>
-        <p:style>
-          <a:lnRef idx="1">
-            <a:schemeClr val="accent6"/>
-          </a:lnRef>
-          <a:fillRef idx="0">
-            <a:schemeClr val="accent6"/>
-          </a:fillRef>
-          <a:effectRef idx="0">
-            <a:schemeClr val="accent6"/>
-          </a:effectRef>
-          <a:fontRef idx="minor">
-            <a:schemeClr val="tx1"/>
-          </a:fontRef>
-        </p:style>
-      </p:cxnSp>
-      <p:cxnSp>
-        <p:nvCxnSpPr>
           <p:cNvPr id="63" name="Straight Arrow Connector 62"/>
           <p:cNvCxnSpPr>
-            <a:stCxn id="26" idx="1"/>
-            <a:endCxn id="25" idx="3"/>
+            <a:stCxn id="55" idx="0"/>
+            <a:endCxn id="26" idx="2"/>
           </p:cNvCxnSpPr>
           <p:nvPr/>
         </p:nvCxnSpPr>
         <p:spPr>
-          <a:xfrm flipH="1">
-            <a:off x="7806459" y="4627393"/>
-            <a:ext cx="551295" cy="0"/>
-          </a:xfrm>
-          <a:prstGeom prst="straightConnector1">
-            <a:avLst/>
+          <a:xfrm rot="5400000" flipH="1" flipV="1">
+            <a:off x="7882794" y="4547242"/>
+            <a:ext cx="394810" cy="1552638"/>
+          </a:xfrm>
+          <a:prstGeom prst="bentConnector3">
+            <a:avLst>
+              <a:gd name="adj1" fmla="val 50000"/>
+            </a:avLst>
           </a:prstGeom>
           <a:ln>
             <a:tailEnd type="triangle"/>
@@ -4342,8 +4339,8 @@
         </p:nvSpPr>
         <p:spPr>
           <a:xfrm>
-            <a:off x="3900391" y="3783147"/>
-            <a:ext cx="811309" cy="553998"/>
+            <a:off x="3805437" y="3939061"/>
+            <a:ext cx="1073085" cy="400110"/>
           </a:xfrm>
           <a:prstGeom prst="rect">
             <a:avLst/>
@@ -4358,7 +4355,7 @@
           <a:p>
             <a:r>
               <a:rPr lang="tr-TR" sz="1000" dirty="0" smtClean="0"/>
-              <a:t>Check dry run no consumers</a:t>
+              <a:t>&lt;args.dry_run no_consumers?&gt;</a:t>
             </a:r>
             <a:endParaRPr lang="tr-TR" sz="1000" dirty="0"/>
           </a:p>
@@ -4373,7 +4370,7 @@
         <p:spPr>
           <a:xfrm>
             <a:off x="3457589" y="4294135"/>
-            <a:ext cx="455574" cy="369332"/>
+            <a:ext cx="433132" cy="246221"/>
           </a:xfrm>
           <a:prstGeom prst="rect">
             <a:avLst/>
@@ -4387,10 +4384,10 @@
           <a:lstStyle/>
           <a:p>
             <a:r>
-              <a:rPr lang="tr-TR" dirty="0" smtClean="0"/>
-              <a:t>No</a:t>
-            </a:r>
-            <a:endParaRPr lang="tr-TR" dirty="0"/>
+              <a:rPr lang="tr-TR" sz="1000" dirty="0" smtClean="0"/>
+              <a:t>[NO]</a:t>
+            </a:r>
+            <a:endParaRPr lang="tr-TR" sz="1000" dirty="0"/>
           </a:p>
         </p:txBody>
       </p:sp>
@@ -4481,7 +4478,7 @@
         <p:spPr>
           <a:xfrm>
             <a:off x="4256126" y="5448585"/>
-            <a:ext cx="485518" cy="369332"/>
+            <a:ext cx="449162" cy="246221"/>
           </a:xfrm>
           <a:prstGeom prst="rect">
             <a:avLst/>
@@ -4495,10 +4492,10 @@
           <a:lstStyle/>
           <a:p>
             <a:r>
-              <a:rPr lang="tr-TR" dirty="0" smtClean="0"/>
-              <a:t>Yes</a:t>
-            </a:r>
-            <a:endParaRPr lang="tr-TR" dirty="0"/>
+              <a:rPr lang="tr-TR" sz="1000" dirty="0" smtClean="0"/>
+              <a:t>[YES]</a:t>
+            </a:r>
+            <a:endParaRPr lang="tr-TR" sz="1000" dirty="0"/>
           </a:p>
         </p:txBody>
       </p:sp>
@@ -4690,8 +4687,8 @@
         </p:nvSpPr>
         <p:spPr>
           <a:xfrm>
-            <a:off x="693250" y="4251123"/>
-            <a:ext cx="1129348" cy="369332"/>
+            <a:off x="185396" y="4659768"/>
+            <a:ext cx="1617751" cy="253916"/>
           </a:xfrm>
           <a:prstGeom prst="rect">
             <a:avLst/>
@@ -4705,10 +4702,982 @@
           <a:lstStyle/>
           <a:p>
             <a:r>
-              <a:rPr lang="tr-TR" dirty="0" smtClean="0"/>
-              <a:t>Terminate</a:t>
-            </a:r>
-            <a:endParaRPr lang="tr-TR" dirty="0"/>
+              <a:rPr lang="tr-TR" sz="1050" dirty="0" smtClean="0"/>
+              <a:t>Signal, Keyboard Interrupt</a:t>
+            </a:r>
+            <a:endParaRPr lang="tr-TR" sz="1050" dirty="0"/>
+          </a:p>
+        </p:txBody>
+      </p:sp>
+      <p:sp>
+        <p:nvSpPr>
+          <p:cNvPr id="53" name="Rounded Rectangle 52"/>
+          <p:cNvSpPr/>
+          <p:nvPr/>
+        </p:nvSpPr>
+        <p:spPr>
+          <a:xfrm>
+            <a:off x="9919562" y="5520968"/>
+            <a:ext cx="997527" cy="997527"/>
+          </a:xfrm>
+          <a:prstGeom prst="roundRect">
+            <a:avLst/>
+          </a:prstGeom>
+        </p:spPr>
+        <p:style>
+          <a:lnRef idx="2">
+            <a:schemeClr val="dk1"/>
+          </a:lnRef>
+          <a:fillRef idx="1">
+            <a:schemeClr val="lt1"/>
+          </a:fillRef>
+          <a:effectRef idx="0">
+            <a:schemeClr val="dk1"/>
+          </a:effectRef>
+          <a:fontRef idx="minor">
+            <a:schemeClr val="dk1"/>
+          </a:fontRef>
+        </p:style>
+        <p:txBody>
+          <a:bodyPr rtlCol="0" anchor="ctr"/>
+          <a:lstStyle/>
+          <a:p>
+            <a:pPr algn="ctr"/>
+            <a:r>
+              <a:rPr lang="tr-TR" sz="1000" dirty="0" smtClean="0"/>
+              <a:t>Register Signals</a:t>
+            </a:r>
+            <a:endParaRPr lang="tr-TR" sz="1000" dirty="0"/>
+          </a:p>
+        </p:txBody>
+      </p:sp>
+      <p:sp>
+        <p:nvSpPr>
+          <p:cNvPr id="55" name="Rounded Rectangle 54"/>
+          <p:cNvSpPr/>
+          <p:nvPr/>
+        </p:nvSpPr>
+        <p:spPr>
+          <a:xfrm>
+            <a:off x="6805116" y="5520966"/>
+            <a:ext cx="997527" cy="997527"/>
+          </a:xfrm>
+          <a:prstGeom prst="roundRect">
+            <a:avLst/>
+          </a:prstGeom>
+        </p:spPr>
+        <p:style>
+          <a:lnRef idx="2">
+            <a:schemeClr val="dk1"/>
+          </a:lnRef>
+          <a:fillRef idx="1">
+            <a:schemeClr val="lt1"/>
+          </a:fillRef>
+          <a:effectRef idx="0">
+            <a:schemeClr val="dk1"/>
+          </a:effectRef>
+          <a:fontRef idx="minor">
+            <a:schemeClr val="dk1"/>
+          </a:fontRef>
+        </p:style>
+        <p:txBody>
+          <a:bodyPr rtlCol="0" anchor="ctr"/>
+          <a:lstStyle/>
+          <a:p>
+            <a:pPr algn="ctr"/>
+            <a:r>
+              <a:rPr lang="tr-TR" sz="1000" dirty="0" smtClean="0"/>
+              <a:t>Lock</a:t>
+            </a:r>
+            <a:endParaRPr lang="tr-TR" sz="1000" dirty="0"/>
+          </a:p>
+        </p:txBody>
+      </p:sp>
+      <p:cxnSp>
+        <p:nvCxnSpPr>
+          <p:cNvPr id="58" name="Straight Arrow Connector 57"/>
+          <p:cNvCxnSpPr>
+            <a:stCxn id="24" idx="2"/>
+            <a:endCxn id="53" idx="0"/>
+          </p:cNvCxnSpPr>
+          <p:nvPr/>
+        </p:nvCxnSpPr>
+        <p:spPr>
+          <a:xfrm>
+            <a:off x="10418326" y="5126157"/>
+            <a:ext cx="0" cy="394811"/>
+          </a:xfrm>
+          <a:prstGeom prst="straightConnector1">
+            <a:avLst/>
+          </a:prstGeom>
+          <a:ln>
+            <a:tailEnd type="triangle"/>
+          </a:ln>
+        </p:spPr>
+        <p:style>
+          <a:lnRef idx="1">
+            <a:schemeClr val="accent6"/>
+          </a:lnRef>
+          <a:fillRef idx="0">
+            <a:schemeClr val="accent6"/>
+          </a:fillRef>
+          <a:effectRef idx="0">
+            <a:schemeClr val="accent6"/>
+          </a:effectRef>
+          <a:fontRef idx="minor">
+            <a:schemeClr val="tx1"/>
+          </a:fontRef>
+        </p:style>
+      </p:cxnSp>
+      <p:sp>
+        <p:nvSpPr>
+          <p:cNvPr id="59" name="Diamond 58"/>
+          <p:cNvSpPr/>
+          <p:nvPr/>
+        </p:nvSpPr>
+        <p:spPr>
+          <a:xfrm>
+            <a:off x="8597898" y="5761112"/>
+            <a:ext cx="517237" cy="517237"/>
+          </a:xfrm>
+          <a:prstGeom prst="diamond">
+            <a:avLst/>
+          </a:prstGeom>
+        </p:spPr>
+        <p:style>
+          <a:lnRef idx="2">
+            <a:schemeClr val="dk1"/>
+          </a:lnRef>
+          <a:fillRef idx="1">
+            <a:schemeClr val="lt1"/>
+          </a:fillRef>
+          <a:effectRef idx="0">
+            <a:schemeClr val="dk1"/>
+          </a:effectRef>
+          <a:fontRef idx="minor">
+            <a:schemeClr val="dk1"/>
+          </a:fontRef>
+        </p:style>
+        <p:txBody>
+          <a:bodyPr rtlCol="0" anchor="ctr"/>
+          <a:lstStyle/>
+          <a:p>
+            <a:pPr algn="ctr"/>
+            <a:endParaRPr lang="tr-TR"/>
+          </a:p>
+        </p:txBody>
+      </p:sp>
+      <p:sp>
+        <p:nvSpPr>
+          <p:cNvPr id="60" name="TextBox 59"/>
+          <p:cNvSpPr txBox="1"/>
+          <p:nvPr/>
+        </p:nvSpPr>
+        <p:spPr>
+          <a:xfrm>
+            <a:off x="8379336" y="6228876"/>
+            <a:ext cx="1047297" cy="246221"/>
+          </a:xfrm>
+          <a:prstGeom prst="rect">
+            <a:avLst/>
+          </a:prstGeom>
+          <a:noFill/>
+        </p:spPr>
+        <p:txBody>
+          <a:bodyPr wrap="square" rtlCol="0">
+            <a:spAutoFit/>
+          </a:bodyPr>
+          <a:lstStyle/>
+          <a:p>
+            <a:r>
+              <a:rPr lang="tr-TR" sz="1000" dirty="0" smtClean="0"/>
+              <a:t>&lt;args.dry_run?&gt;</a:t>
+            </a:r>
+            <a:endParaRPr lang="tr-TR" sz="1000" dirty="0"/>
+          </a:p>
+        </p:txBody>
+      </p:sp>
+      <p:cxnSp>
+        <p:nvCxnSpPr>
+          <p:cNvPr id="62" name="Straight Arrow Connector 61"/>
+          <p:cNvCxnSpPr>
+            <a:stCxn id="53" idx="1"/>
+            <a:endCxn id="59" idx="3"/>
+          </p:cNvCxnSpPr>
+          <p:nvPr/>
+        </p:nvCxnSpPr>
+        <p:spPr>
+          <a:xfrm flipH="1" flipV="1">
+            <a:off x="9115135" y="6019731"/>
+            <a:ext cx="804427" cy="1"/>
+          </a:xfrm>
+          <a:prstGeom prst="straightConnector1">
+            <a:avLst/>
+          </a:prstGeom>
+          <a:ln>
+            <a:tailEnd type="triangle"/>
+          </a:ln>
+        </p:spPr>
+        <p:style>
+          <a:lnRef idx="1">
+            <a:schemeClr val="accent6"/>
+          </a:lnRef>
+          <a:fillRef idx="0">
+            <a:schemeClr val="accent6"/>
+          </a:fillRef>
+          <a:effectRef idx="0">
+            <a:schemeClr val="accent6"/>
+          </a:effectRef>
+          <a:fontRef idx="minor">
+            <a:schemeClr val="tx1"/>
+          </a:fontRef>
+        </p:style>
+      </p:cxnSp>
+      <p:cxnSp>
+        <p:nvCxnSpPr>
+          <p:cNvPr id="64" name="Straight Arrow Connector 63"/>
+          <p:cNvCxnSpPr>
+            <a:stCxn id="59" idx="0"/>
+            <a:endCxn id="26" idx="2"/>
+          </p:cNvCxnSpPr>
+          <p:nvPr/>
+        </p:nvCxnSpPr>
+        <p:spPr>
+          <a:xfrm flipV="1">
+            <a:off x="8856517" y="5126156"/>
+            <a:ext cx="1" cy="634956"/>
+          </a:xfrm>
+          <a:prstGeom prst="straightConnector1">
+            <a:avLst/>
+          </a:prstGeom>
+          <a:ln>
+            <a:tailEnd type="triangle"/>
+          </a:ln>
+        </p:spPr>
+        <p:style>
+          <a:lnRef idx="1">
+            <a:schemeClr val="accent6"/>
+          </a:lnRef>
+          <a:fillRef idx="0">
+            <a:schemeClr val="accent6"/>
+          </a:fillRef>
+          <a:effectRef idx="0">
+            <a:schemeClr val="accent6"/>
+          </a:effectRef>
+          <a:fontRef idx="minor">
+            <a:schemeClr val="tx1"/>
+          </a:fontRef>
+        </p:style>
+      </p:cxnSp>
+      <p:sp>
+        <p:nvSpPr>
+          <p:cNvPr id="67" name="TextBox 66"/>
+          <p:cNvSpPr txBox="1"/>
+          <p:nvPr/>
+        </p:nvSpPr>
+        <p:spPr>
+          <a:xfrm>
+            <a:off x="8843606" y="5443634"/>
+            <a:ext cx="449162" cy="246221"/>
+          </a:xfrm>
+          <a:prstGeom prst="rect">
+            <a:avLst/>
+          </a:prstGeom>
+          <a:noFill/>
+        </p:spPr>
+        <p:txBody>
+          <a:bodyPr wrap="none" rtlCol="0">
+            <a:spAutoFit/>
+          </a:bodyPr>
+          <a:lstStyle/>
+          <a:p>
+            <a:r>
+              <a:rPr lang="tr-TR" sz="1000" dirty="0" smtClean="0"/>
+              <a:t>[YES]</a:t>
+            </a:r>
+            <a:endParaRPr lang="tr-TR" sz="1000" dirty="0"/>
+          </a:p>
+        </p:txBody>
+      </p:sp>
+      <p:cxnSp>
+        <p:nvCxnSpPr>
+          <p:cNvPr id="69" name="Straight Arrow Connector 68"/>
+          <p:cNvCxnSpPr>
+            <a:stCxn id="59" idx="1"/>
+            <a:endCxn id="55" idx="3"/>
+          </p:cNvCxnSpPr>
+          <p:nvPr/>
+        </p:nvCxnSpPr>
+        <p:spPr>
+          <a:xfrm flipH="1" flipV="1">
+            <a:off x="7802643" y="6019730"/>
+            <a:ext cx="795255" cy="1"/>
+          </a:xfrm>
+          <a:prstGeom prst="straightConnector1">
+            <a:avLst/>
+          </a:prstGeom>
+          <a:ln>
+            <a:tailEnd type="triangle"/>
+          </a:ln>
+        </p:spPr>
+        <p:style>
+          <a:lnRef idx="2">
+            <a:schemeClr val="dk1"/>
+          </a:lnRef>
+          <a:fillRef idx="0">
+            <a:schemeClr val="dk1"/>
+          </a:fillRef>
+          <a:effectRef idx="1">
+            <a:schemeClr val="dk1"/>
+          </a:effectRef>
+          <a:fontRef idx="minor">
+            <a:schemeClr val="tx1"/>
+          </a:fontRef>
+        </p:style>
+      </p:cxnSp>
+      <p:cxnSp>
+        <p:nvCxnSpPr>
+          <p:cNvPr id="77" name="Straight Arrow Connector 76"/>
+          <p:cNvCxnSpPr>
+            <a:stCxn id="26" idx="1"/>
+            <a:endCxn id="25" idx="3"/>
+          </p:cNvCxnSpPr>
+          <p:nvPr/>
+        </p:nvCxnSpPr>
+        <p:spPr>
+          <a:xfrm flipH="1">
+            <a:off x="7806459" y="4627393"/>
+            <a:ext cx="551295" cy="0"/>
+          </a:xfrm>
+          <a:prstGeom prst="straightConnector1">
+            <a:avLst/>
+          </a:prstGeom>
+          <a:ln>
+            <a:tailEnd type="triangle"/>
+          </a:ln>
+        </p:spPr>
+        <p:style>
+          <a:lnRef idx="1">
+            <a:schemeClr val="accent6"/>
+          </a:lnRef>
+          <a:fillRef idx="0">
+            <a:schemeClr val="accent6"/>
+          </a:fillRef>
+          <a:effectRef idx="0">
+            <a:schemeClr val="accent6"/>
+          </a:effectRef>
+          <a:fontRef idx="minor">
+            <a:schemeClr val="tx1"/>
+          </a:fontRef>
+        </p:style>
+      </p:cxnSp>
+      <p:sp>
+        <p:nvSpPr>
+          <p:cNvPr id="80" name="TextBox 79"/>
+          <p:cNvSpPr txBox="1"/>
+          <p:nvPr/>
+        </p:nvSpPr>
+        <p:spPr>
+          <a:xfrm>
+            <a:off x="8030373" y="5991474"/>
+            <a:ext cx="433132" cy="246221"/>
+          </a:xfrm>
+          <a:prstGeom prst="rect">
+            <a:avLst/>
+          </a:prstGeom>
+          <a:noFill/>
+        </p:spPr>
+        <p:txBody>
+          <a:bodyPr wrap="none" rtlCol="0">
+            <a:spAutoFit/>
+          </a:bodyPr>
+          <a:lstStyle/>
+          <a:p>
+            <a:r>
+              <a:rPr lang="tr-TR" sz="1000" dirty="0" smtClean="0"/>
+              <a:t>[NO]</a:t>
+            </a:r>
+            <a:endParaRPr lang="tr-TR" sz="1000" dirty="0"/>
+          </a:p>
+        </p:txBody>
+      </p:sp>
+      <p:sp>
+        <p:nvSpPr>
+          <p:cNvPr id="91" name="Rounded Rectangle 90"/>
+          <p:cNvSpPr/>
+          <p:nvPr/>
+        </p:nvSpPr>
+        <p:spPr>
+          <a:xfrm>
+            <a:off x="1798186" y="118688"/>
+            <a:ext cx="997527" cy="997527"/>
+          </a:xfrm>
+          <a:prstGeom prst="roundRect">
+            <a:avLst/>
+          </a:prstGeom>
+        </p:spPr>
+        <p:style>
+          <a:lnRef idx="2">
+            <a:schemeClr val="dk1"/>
+          </a:lnRef>
+          <a:fillRef idx="1">
+            <a:schemeClr val="lt1"/>
+          </a:fillRef>
+          <a:effectRef idx="0">
+            <a:schemeClr val="dk1"/>
+          </a:effectRef>
+          <a:fontRef idx="minor">
+            <a:schemeClr val="dk1"/>
+          </a:fontRef>
+        </p:style>
+        <p:txBody>
+          <a:bodyPr rtlCol="0" anchor="ctr"/>
+          <a:lstStyle/>
+          <a:p>
+            <a:pPr algn="ctr"/>
+            <a:r>
+              <a:rPr lang="tr-TR" sz="1200" dirty="0" smtClean="0"/>
+              <a:t>Print Banner</a:t>
+            </a:r>
+            <a:endParaRPr lang="tr-TR" sz="1200" dirty="0"/>
+          </a:p>
+        </p:txBody>
+      </p:sp>
+      <p:sp>
+        <p:nvSpPr>
+          <p:cNvPr id="94" name="Rounded Rectangle 93"/>
+          <p:cNvSpPr/>
+          <p:nvPr/>
+        </p:nvSpPr>
+        <p:spPr>
+          <a:xfrm>
+            <a:off x="3055071" y="118688"/>
+            <a:ext cx="997527" cy="997527"/>
+          </a:xfrm>
+          <a:prstGeom prst="roundRect">
+            <a:avLst/>
+          </a:prstGeom>
+        </p:spPr>
+        <p:style>
+          <a:lnRef idx="2">
+            <a:schemeClr val="dk1"/>
+          </a:lnRef>
+          <a:fillRef idx="1">
+            <a:schemeClr val="lt1"/>
+          </a:fillRef>
+          <a:effectRef idx="0">
+            <a:schemeClr val="dk1"/>
+          </a:effectRef>
+          <a:fontRef idx="minor">
+            <a:schemeClr val="dk1"/>
+          </a:fontRef>
+        </p:style>
+        <p:txBody>
+          <a:bodyPr rtlCol="0" anchor="ctr"/>
+          <a:lstStyle/>
+          <a:p>
+            <a:pPr algn="ctr"/>
+            <a:r>
+              <a:rPr lang="tr-TR" sz="1000" dirty="0" smtClean="0"/>
+              <a:t>Init Loggers</a:t>
+            </a:r>
+            <a:endParaRPr lang="tr-TR" sz="1000" dirty="0"/>
+          </a:p>
+        </p:txBody>
+      </p:sp>
+      <p:cxnSp>
+        <p:nvCxnSpPr>
+          <p:cNvPr id="97" name="Straight Arrow Connector 96"/>
+          <p:cNvCxnSpPr>
+            <a:stCxn id="91" idx="3"/>
+            <a:endCxn id="94" idx="1"/>
+          </p:cNvCxnSpPr>
+          <p:nvPr/>
+        </p:nvCxnSpPr>
+        <p:spPr>
+          <a:xfrm>
+            <a:off x="2795713" y="617452"/>
+            <a:ext cx="259358" cy="0"/>
+          </a:xfrm>
+          <a:prstGeom prst="straightConnector1">
+            <a:avLst/>
+          </a:prstGeom>
+          <a:ln>
+            <a:tailEnd type="triangle"/>
+          </a:ln>
+        </p:spPr>
+        <p:style>
+          <a:lnRef idx="1">
+            <a:schemeClr val="accent6"/>
+          </a:lnRef>
+          <a:fillRef idx="0">
+            <a:schemeClr val="accent6"/>
+          </a:fillRef>
+          <a:effectRef idx="0">
+            <a:schemeClr val="accent6"/>
+          </a:effectRef>
+          <a:fontRef idx="minor">
+            <a:schemeClr val="tx1"/>
+          </a:fontRef>
+        </p:style>
+      </p:cxnSp>
+      <p:cxnSp>
+        <p:nvCxnSpPr>
+          <p:cNvPr id="100" name="Straight Arrow Connector 99"/>
+          <p:cNvCxnSpPr>
+            <a:stCxn id="94" idx="3"/>
+            <a:endCxn id="110" idx="1"/>
+          </p:cNvCxnSpPr>
+          <p:nvPr/>
+        </p:nvCxnSpPr>
+        <p:spPr>
+          <a:xfrm flipV="1">
+            <a:off x="4052598" y="617451"/>
+            <a:ext cx="288600" cy="1"/>
+          </a:xfrm>
+          <a:prstGeom prst="straightConnector1">
+            <a:avLst/>
+          </a:prstGeom>
+          <a:ln>
+            <a:tailEnd type="triangle"/>
+          </a:ln>
+        </p:spPr>
+        <p:style>
+          <a:lnRef idx="1">
+            <a:schemeClr val="accent6"/>
+          </a:lnRef>
+          <a:fillRef idx="0">
+            <a:schemeClr val="accent6"/>
+          </a:fillRef>
+          <a:effectRef idx="0">
+            <a:schemeClr val="accent6"/>
+          </a:effectRef>
+          <a:fontRef idx="minor">
+            <a:schemeClr val="tx1"/>
+          </a:fontRef>
+        </p:style>
+      </p:cxnSp>
+      <p:sp>
+        <p:nvSpPr>
+          <p:cNvPr id="110" name="Rounded Rectangle 109"/>
+          <p:cNvSpPr/>
+          <p:nvPr/>
+        </p:nvSpPr>
+        <p:spPr>
+          <a:xfrm>
+            <a:off x="4341198" y="118687"/>
+            <a:ext cx="997527" cy="997527"/>
+          </a:xfrm>
+          <a:prstGeom prst="roundRect">
+            <a:avLst/>
+          </a:prstGeom>
+        </p:spPr>
+        <p:style>
+          <a:lnRef idx="2">
+            <a:schemeClr val="dk1"/>
+          </a:lnRef>
+          <a:fillRef idx="1">
+            <a:schemeClr val="lt1"/>
+          </a:fillRef>
+          <a:effectRef idx="0">
+            <a:schemeClr val="dk1"/>
+          </a:effectRef>
+          <a:fontRef idx="minor">
+            <a:schemeClr val="dk1"/>
+          </a:fontRef>
+        </p:style>
+        <p:txBody>
+          <a:bodyPr rtlCol="0" anchor="ctr"/>
+          <a:lstStyle/>
+          <a:p>
+            <a:pPr algn="ctr"/>
+            <a:r>
+              <a:rPr lang="tr-TR" sz="1000" dirty="0" smtClean="0"/>
+              <a:t>Build Node Client</a:t>
+            </a:r>
+            <a:endParaRPr lang="tr-TR" sz="1000" dirty="0"/>
+          </a:p>
+        </p:txBody>
+      </p:sp>
+      <p:cxnSp>
+        <p:nvCxnSpPr>
+          <p:cNvPr id="116" name="Straight Arrow Connector 115"/>
+          <p:cNvCxnSpPr>
+            <a:stCxn id="110" idx="2"/>
+            <a:endCxn id="7" idx="0"/>
+          </p:cNvCxnSpPr>
+          <p:nvPr/>
+        </p:nvCxnSpPr>
+        <p:spPr>
+          <a:xfrm flipH="1">
+            <a:off x="4839961" y="1116214"/>
+            <a:ext cx="1" cy="278477"/>
+          </a:xfrm>
+          <a:prstGeom prst="straightConnector1">
+            <a:avLst/>
+          </a:prstGeom>
+          <a:ln>
+            <a:tailEnd type="triangle"/>
+          </a:ln>
+        </p:spPr>
+        <p:style>
+          <a:lnRef idx="1">
+            <a:schemeClr val="accent6"/>
+          </a:lnRef>
+          <a:fillRef idx="0">
+            <a:schemeClr val="accent6"/>
+          </a:fillRef>
+          <a:effectRef idx="0">
+            <a:schemeClr val="accent6"/>
+          </a:effectRef>
+          <a:fontRef idx="minor">
+            <a:schemeClr val="tx1"/>
+          </a:fontRef>
+        </p:style>
+      </p:cxnSp>
+      <p:sp>
+        <p:nvSpPr>
+          <p:cNvPr id="120" name="Rounded Rectangle 119"/>
+          <p:cNvSpPr>
+            <a:spLocks noChangeAspect="1"/>
+          </p:cNvSpPr>
+          <p:nvPr/>
+        </p:nvSpPr>
+        <p:spPr>
+          <a:xfrm>
+            <a:off x="7448917" y="1690407"/>
+            <a:ext cx="798022" cy="798022"/>
+          </a:xfrm>
+          <a:prstGeom prst="roundRect">
+            <a:avLst/>
+          </a:prstGeom>
+        </p:spPr>
+        <p:style>
+          <a:lnRef idx="2">
+            <a:schemeClr val="dk1"/>
+          </a:lnRef>
+          <a:fillRef idx="1">
+            <a:schemeClr val="lt1"/>
+          </a:fillRef>
+          <a:effectRef idx="0">
+            <a:schemeClr val="dk1"/>
+          </a:effectRef>
+          <a:fontRef idx="minor">
+            <a:schemeClr val="dk1"/>
+          </a:fontRef>
+        </p:style>
+        <p:txBody>
+          <a:bodyPr rtlCol="0" anchor="ctr"/>
+          <a:lstStyle/>
+          <a:p>
+            <a:pPr algn="ctr"/>
+            <a:r>
+              <a:rPr lang="tr-TR" sz="1000" dirty="0" smtClean="0"/>
+              <a:t>Build Parser</a:t>
+            </a:r>
+            <a:endParaRPr lang="tr-TR" sz="1000" dirty="0"/>
+          </a:p>
+        </p:txBody>
+      </p:sp>
+      <p:sp>
+        <p:nvSpPr>
+          <p:cNvPr id="121" name="Rounded Rectangle 120"/>
+          <p:cNvSpPr>
+            <a:spLocks noChangeAspect="1"/>
+          </p:cNvSpPr>
+          <p:nvPr/>
+        </p:nvSpPr>
+        <p:spPr>
+          <a:xfrm>
+            <a:off x="8689771" y="1696688"/>
+            <a:ext cx="798022" cy="798022"/>
+          </a:xfrm>
+          <a:prstGeom prst="roundRect">
+            <a:avLst/>
+          </a:prstGeom>
+        </p:spPr>
+        <p:style>
+          <a:lnRef idx="2">
+            <a:schemeClr val="dk1"/>
+          </a:lnRef>
+          <a:fillRef idx="1">
+            <a:schemeClr val="lt1"/>
+          </a:fillRef>
+          <a:effectRef idx="0">
+            <a:schemeClr val="dk1"/>
+          </a:effectRef>
+          <a:fontRef idx="minor">
+            <a:schemeClr val="dk1"/>
+          </a:fontRef>
+        </p:style>
+        <p:txBody>
+          <a:bodyPr rtlCol="0" anchor="ctr"/>
+          <a:lstStyle/>
+          <a:p>
+            <a:pPr algn="ctr"/>
+            <a:r>
+              <a:rPr lang="tr-TR" sz="1000" dirty="0" smtClean="0"/>
+              <a:t>Validate Config File</a:t>
+            </a:r>
+            <a:endParaRPr lang="tr-TR" sz="1000" dirty="0"/>
+          </a:p>
+        </p:txBody>
+      </p:sp>
+      <p:cxnSp>
+        <p:nvCxnSpPr>
+          <p:cNvPr id="129" name="Straight Arrow Connector 128"/>
+          <p:cNvCxnSpPr>
+            <a:stCxn id="13" idx="2"/>
+            <a:endCxn id="121" idx="1"/>
+          </p:cNvCxnSpPr>
+          <p:nvPr/>
+        </p:nvCxnSpPr>
+        <p:spPr>
+          <a:xfrm rot="16200000" flipH="1">
+            <a:off x="8344305" y="1750232"/>
+            <a:ext cx="476789" cy="214143"/>
+          </a:xfrm>
+          <a:prstGeom prst="bentConnector2">
+            <a:avLst/>
+          </a:prstGeom>
+          <a:ln>
+            <a:tailEnd type="triangle"/>
+          </a:ln>
+        </p:spPr>
+        <p:style>
+          <a:lnRef idx="1">
+            <a:schemeClr val="accent6"/>
+          </a:lnRef>
+          <a:fillRef idx="0">
+            <a:schemeClr val="accent6"/>
+          </a:fillRef>
+          <a:effectRef idx="0">
+            <a:schemeClr val="accent6"/>
+          </a:effectRef>
+          <a:fontRef idx="minor">
+            <a:schemeClr val="tx1"/>
+          </a:fontRef>
+        </p:style>
+      </p:cxnSp>
+      <p:cxnSp>
+        <p:nvCxnSpPr>
+          <p:cNvPr id="132" name="Straight Arrow Connector 131"/>
+          <p:cNvCxnSpPr>
+            <a:stCxn id="121" idx="0"/>
+            <a:endCxn id="14" idx="1"/>
+          </p:cNvCxnSpPr>
+          <p:nvPr/>
+        </p:nvCxnSpPr>
+        <p:spPr>
+          <a:xfrm rot="5400000" flipH="1" flipV="1">
+            <a:off x="8955056" y="1351310"/>
+            <a:ext cx="479104" cy="211652"/>
+          </a:xfrm>
+          <a:prstGeom prst="bentConnector2">
+            <a:avLst/>
+          </a:prstGeom>
+          <a:ln>
+            <a:tailEnd type="triangle"/>
+          </a:ln>
+        </p:spPr>
+        <p:style>
+          <a:lnRef idx="1">
+            <a:schemeClr val="accent6"/>
+          </a:lnRef>
+          <a:fillRef idx="0">
+            <a:schemeClr val="accent6"/>
+          </a:fillRef>
+          <a:effectRef idx="0">
+            <a:schemeClr val="accent6"/>
+          </a:effectRef>
+          <a:fontRef idx="minor">
+            <a:schemeClr val="tx1"/>
+          </a:fontRef>
+        </p:style>
+      </p:cxnSp>
+      <p:sp>
+        <p:nvSpPr>
+          <p:cNvPr id="79" name="Diamond 78"/>
+          <p:cNvSpPr/>
+          <p:nvPr/>
+        </p:nvSpPr>
+        <p:spPr>
+          <a:xfrm>
+            <a:off x="866575" y="937505"/>
+            <a:ext cx="517237" cy="517237"/>
+          </a:xfrm>
+          <a:prstGeom prst="diamond">
+            <a:avLst/>
+          </a:prstGeom>
+        </p:spPr>
+        <p:style>
+          <a:lnRef idx="2">
+            <a:schemeClr val="dk1"/>
+          </a:lnRef>
+          <a:fillRef idx="1">
+            <a:schemeClr val="lt1"/>
+          </a:fillRef>
+          <a:effectRef idx="0">
+            <a:schemeClr val="dk1"/>
+          </a:effectRef>
+          <a:fontRef idx="minor">
+            <a:schemeClr val="dk1"/>
+          </a:fontRef>
+        </p:style>
+        <p:txBody>
+          <a:bodyPr rtlCol="0" anchor="ctr"/>
+          <a:lstStyle/>
+          <a:p>
+            <a:pPr algn="ctr"/>
+            <a:endParaRPr lang="tr-TR"/>
+          </a:p>
+        </p:txBody>
+      </p:sp>
+      <p:cxnSp>
+        <p:nvCxnSpPr>
+          <p:cNvPr id="81" name="Straight Arrow Connector 80"/>
+          <p:cNvCxnSpPr>
+            <a:stCxn id="79" idx="0"/>
+            <a:endCxn id="91" idx="1"/>
+          </p:cNvCxnSpPr>
+          <p:nvPr/>
+        </p:nvCxnSpPr>
+        <p:spPr>
+          <a:xfrm flipV="1">
+            <a:off x="1125194" y="617452"/>
+            <a:ext cx="672992" cy="320053"/>
+          </a:xfrm>
+          <a:prstGeom prst="straightConnector1">
+            <a:avLst/>
+          </a:prstGeom>
+          <a:ln>
+            <a:tailEnd type="triangle"/>
+          </a:ln>
+        </p:spPr>
+        <p:style>
+          <a:lnRef idx="1">
+            <a:schemeClr val="accent6"/>
+          </a:lnRef>
+          <a:fillRef idx="0">
+            <a:schemeClr val="accent6"/>
+          </a:fillRef>
+          <a:effectRef idx="0">
+            <a:schemeClr val="accent6"/>
+          </a:effectRef>
+          <a:fontRef idx="minor">
+            <a:schemeClr val="tx1"/>
+          </a:fontRef>
+        </p:style>
+      </p:cxnSp>
+      <p:cxnSp>
+        <p:nvCxnSpPr>
+          <p:cNvPr id="31" name="Straight Arrow Connector 30"/>
+          <p:cNvCxnSpPr>
+            <a:stCxn id="79" idx="2"/>
+            <a:endCxn id="11" idx="1"/>
+          </p:cNvCxnSpPr>
+          <p:nvPr/>
+        </p:nvCxnSpPr>
+        <p:spPr>
+          <a:xfrm>
+            <a:off x="1125194" y="1454742"/>
+            <a:ext cx="673644" cy="438713"/>
+          </a:xfrm>
+          <a:prstGeom prst="straightConnector1">
+            <a:avLst/>
+          </a:prstGeom>
+          <a:ln>
+            <a:tailEnd type="triangle"/>
+          </a:ln>
+        </p:spPr>
+        <p:style>
+          <a:lnRef idx="1">
+            <a:schemeClr val="accent6"/>
+          </a:lnRef>
+          <a:fillRef idx="0">
+            <a:schemeClr val="accent6"/>
+          </a:fillRef>
+          <a:effectRef idx="0">
+            <a:schemeClr val="accent6"/>
+          </a:effectRef>
+          <a:fontRef idx="minor">
+            <a:schemeClr val="tx1"/>
+          </a:fontRef>
+        </p:style>
+      </p:cxnSp>
+      <p:sp>
+        <p:nvSpPr>
+          <p:cNvPr id="85" name="TextBox 84"/>
+          <p:cNvSpPr txBox="1"/>
+          <p:nvPr/>
+        </p:nvSpPr>
+        <p:spPr>
+          <a:xfrm>
+            <a:off x="337831" y="541874"/>
+            <a:ext cx="1073085" cy="246221"/>
+          </a:xfrm>
+          <a:prstGeom prst="rect">
+            <a:avLst/>
+          </a:prstGeom>
+          <a:noFill/>
+        </p:spPr>
+        <p:txBody>
+          <a:bodyPr wrap="square" rtlCol="0">
+            <a:spAutoFit/>
+          </a:bodyPr>
+          <a:lstStyle/>
+          <a:p>
+            <a:r>
+              <a:rPr lang="tr-TR" sz="1000" dirty="0" smtClean="0"/>
+              <a:t>&lt;</a:t>
+            </a:r>
+            <a:r>
+              <a:rPr lang="tr-TR" sz="1000" dirty="0" smtClean="0"/>
+              <a:t>args</a:t>
+            </a:r>
+            <a:r>
+              <a:rPr lang="tr-TR" sz="1000" dirty="0"/>
+              <a:t> </a:t>
+            </a:r>
+            <a:r>
+              <a:rPr lang="tr-TR" sz="1000" dirty="0" smtClean="0"/>
+              <a:t>is given</a:t>
+            </a:r>
+            <a:r>
+              <a:rPr lang="tr-TR" sz="1000" dirty="0" smtClean="0"/>
+              <a:t>?&gt;</a:t>
+            </a:r>
+            <a:endParaRPr lang="tr-TR" sz="1000" dirty="0"/>
+          </a:p>
+        </p:txBody>
+      </p:sp>
+      <p:sp>
+        <p:nvSpPr>
+          <p:cNvPr id="95" name="TextBox 94"/>
+          <p:cNvSpPr txBox="1"/>
+          <p:nvPr/>
+        </p:nvSpPr>
+        <p:spPr>
+          <a:xfrm>
+            <a:off x="1314247" y="759855"/>
+            <a:ext cx="449162" cy="246221"/>
+          </a:xfrm>
+          <a:prstGeom prst="rect">
+            <a:avLst/>
+          </a:prstGeom>
+          <a:noFill/>
+        </p:spPr>
+        <p:txBody>
+          <a:bodyPr wrap="none" rtlCol="0">
+            <a:spAutoFit/>
+          </a:bodyPr>
+          <a:lstStyle/>
+          <a:p>
+            <a:r>
+              <a:rPr lang="tr-TR" sz="1000" dirty="0" smtClean="0"/>
+              <a:t>[YES]</a:t>
+            </a:r>
+            <a:endParaRPr lang="tr-TR" sz="1000" dirty="0"/>
           </a:p>
         </p:txBody>
       </p:sp>

</xml_diff>